<commit_message>
add link to tronium.ch.gg
</commit_message>
<xml_diff>
--- a/PowerPoint/Presentation.pptx
+++ b/PowerPoint/Presentation.pptx
@@ -147,7 +147,7 @@
   </p:defaultTextStyle>
   <p:extLst>
     <p:ext uri="{EFAFB233-063F-42B5-8137-9DF3F51BA10A}">
-      <p15:sldGuideLst xmlns:p15="http://schemas.microsoft.com/office/powerpoint/2012/main" xmlns="">
+      <p15:sldGuideLst xmlns:p15="http://schemas.microsoft.com/office/powerpoint/2012/main">
         <p15:guide id="1" orient="horz" pos="2160">
           <p15:clr>
             <a:srgbClr val="A4A3A4"/>
@@ -1433,7 +1433,7 @@
                   <a:spcPct val="50000"/>
                 </a:spcBef>
               </a:pPr>
-              <a:t>Thursday, 19 December 2013</a:t>
+              <a:t>Friday, 20 December 2013</a:t>
             </a:fld>
             <a:endParaRPr lang="de-CH" sz="900">
               <a:solidFill>
@@ -3898,7 +3898,7 @@
                   <a:spcPct val="50000"/>
                 </a:spcBef>
               </a:pPr>
-              <a:t>Thursday, 19 December 2013</a:t>
+              <a:t>Friday, 20 December 2013</a:t>
             </a:fld>
             <a:endParaRPr lang="en-GB" sz="800" dirty="0">
               <a:solidFill>
@@ -4635,44 +4635,6 @@
           <a:chExt cx="0" cy="0"/>
         </a:xfrm>
       </p:grpSpPr>
-      <p:sp>
-        <p:nvSpPr>
-          <p:cNvPr id="2" name="Titel 1"/>
-          <p:cNvSpPr>
-            <a:spLocks noGrp="1"/>
-          </p:cNvSpPr>
-          <p:nvPr>
-            <p:ph type="title"/>
-          </p:nvPr>
-        </p:nvSpPr>
-        <p:spPr/>
-        <p:txBody>
-          <a:bodyPr/>
-          <a:lstStyle/>
-          <a:p>
-            <a:endParaRPr lang="de-CH"/>
-          </a:p>
-        </p:txBody>
-      </p:sp>
-      <p:sp>
-        <p:nvSpPr>
-          <p:cNvPr id="6" name="Inhaltsplatzhalter 5"/>
-          <p:cNvSpPr>
-            <a:spLocks noGrp="1"/>
-          </p:cNvSpPr>
-          <p:nvPr>
-            <p:ph idx="1"/>
-          </p:nvPr>
-        </p:nvSpPr>
-        <p:spPr/>
-        <p:txBody>
-          <a:bodyPr/>
-          <a:lstStyle/>
-          <a:p>
-            <a:endParaRPr lang="de-CH"/>
-          </a:p>
-        </p:txBody>
-      </p:sp>
     </p:spTree>
     <p:extLst>
       <p:ext uri="{BB962C8B-B14F-4D97-AF65-F5344CB8AC3E}">
@@ -4935,6 +4897,239 @@
           </a:p>
         </p:txBody>
       </p:sp>
+      <p:sp>
+        <p:nvSpPr>
+          <p:cNvPr id="7" name="Titel 1"/>
+          <p:cNvSpPr txBox="1">
+            <a:spLocks/>
+          </p:cNvSpPr>
+          <p:nvPr/>
+        </p:nvSpPr>
+        <p:spPr bwMode="auto">
+          <a:xfrm>
+            <a:off x="541666" y="6226266"/>
+            <a:ext cx="8077200" cy="457200"/>
+          </a:xfrm>
+          <a:prstGeom prst="rect">
+            <a:avLst/>
+          </a:prstGeom>
+          <a:noFill/>
+          <a:ln>
+            <a:noFill/>
+          </a:ln>
+          <a:effectLst/>
+          <a:extLst>
+            <a:ext uri="{909E8E84-426E-40DD-AFC4-6F175D3DCCD1}">
+              <a14:hiddenFill xmlns:a14="http://schemas.microsoft.com/office/drawing/2010/main">
+                <a:solidFill>
+                  <a:schemeClr val="accent1"/>
+                </a:solidFill>
+              </a14:hiddenFill>
+            </a:ext>
+            <a:ext uri="{91240B29-F687-4F45-9708-019B960494DF}">
+              <a14:hiddenLine xmlns:a14="http://schemas.microsoft.com/office/drawing/2010/main" w="9525">
+                <a:solidFill>
+                  <a:schemeClr val="tx1"/>
+                </a:solidFill>
+                <a:miter lim="800000"/>
+                <a:headEnd/>
+                <a:tailEnd/>
+              </a14:hiddenLine>
+            </a:ext>
+            <a:ext uri="{AF507438-7753-43E0-B8FC-AC1667EBCBE1}">
+              <a14:hiddenEffects xmlns:a14="http://schemas.microsoft.com/office/drawing/2010/main">
+                <a:effectLst>
+                  <a:outerShdw dist="35921" dir="2700000" algn="ctr" rotWithShape="0">
+                    <a:schemeClr val="bg2"/>
+                  </a:outerShdw>
+                </a:effectLst>
+              </a14:hiddenEffects>
+            </a:ext>
+          </a:extLst>
+        </p:spPr>
+        <p:txBody>
+          <a:bodyPr vert="horz" wrap="square" lIns="0" tIns="0" rIns="0" bIns="0" numCol="1" anchor="t" anchorCtr="0" compatLnSpc="1">
+            <a:prstTxWarp prst="textNoShape">
+              <a:avLst/>
+            </a:prstTxWarp>
+          </a:bodyPr>
+          <a:lstStyle>
+            <a:lvl1pPr algn="l" rtl="0" eaLnBrk="1" fontAlgn="base" hangingPunct="1">
+              <a:lnSpc>
+                <a:spcPts val="3800"/>
+              </a:lnSpc>
+              <a:spcBef>
+                <a:spcPct val="0"/>
+              </a:spcBef>
+              <a:spcAft>
+                <a:spcPct val="0"/>
+              </a:spcAft>
+              <a:defRPr sz="3200" b="1" kern="1200">
+                <a:solidFill>
+                  <a:srgbClr val="2A6AB3"/>
+                </a:solidFill>
+                <a:latin typeface="+mj-lt"/>
+                <a:ea typeface="+mj-ea"/>
+                <a:cs typeface="+mj-cs"/>
+              </a:defRPr>
+            </a:lvl1pPr>
+            <a:lvl2pPr algn="l" rtl="0" eaLnBrk="1" fontAlgn="base" hangingPunct="1">
+              <a:lnSpc>
+                <a:spcPts val="3800"/>
+              </a:lnSpc>
+              <a:spcBef>
+                <a:spcPct val="0"/>
+              </a:spcBef>
+              <a:spcAft>
+                <a:spcPct val="0"/>
+              </a:spcAft>
+              <a:defRPr sz="3200" b="1">
+                <a:solidFill>
+                  <a:srgbClr val="2A6AB3"/>
+                </a:solidFill>
+                <a:latin typeface="Arial" panose="020B0604020202020204" pitchFamily="34" charset="0"/>
+              </a:defRPr>
+            </a:lvl2pPr>
+            <a:lvl3pPr algn="l" rtl="0" eaLnBrk="1" fontAlgn="base" hangingPunct="1">
+              <a:lnSpc>
+                <a:spcPts val="3800"/>
+              </a:lnSpc>
+              <a:spcBef>
+                <a:spcPct val="0"/>
+              </a:spcBef>
+              <a:spcAft>
+                <a:spcPct val="0"/>
+              </a:spcAft>
+              <a:defRPr sz="3200" b="1">
+                <a:solidFill>
+                  <a:srgbClr val="2A6AB3"/>
+                </a:solidFill>
+                <a:latin typeface="Arial" panose="020B0604020202020204" pitchFamily="34" charset="0"/>
+              </a:defRPr>
+            </a:lvl3pPr>
+            <a:lvl4pPr algn="l" rtl="0" eaLnBrk="1" fontAlgn="base" hangingPunct="1">
+              <a:lnSpc>
+                <a:spcPts val="3800"/>
+              </a:lnSpc>
+              <a:spcBef>
+                <a:spcPct val="0"/>
+              </a:spcBef>
+              <a:spcAft>
+                <a:spcPct val="0"/>
+              </a:spcAft>
+              <a:defRPr sz="3200" b="1">
+                <a:solidFill>
+                  <a:srgbClr val="2A6AB3"/>
+                </a:solidFill>
+                <a:latin typeface="Arial" panose="020B0604020202020204" pitchFamily="34" charset="0"/>
+              </a:defRPr>
+            </a:lvl4pPr>
+            <a:lvl5pPr algn="l" rtl="0" eaLnBrk="1" fontAlgn="base" hangingPunct="1">
+              <a:lnSpc>
+                <a:spcPts val="3800"/>
+              </a:lnSpc>
+              <a:spcBef>
+                <a:spcPct val="0"/>
+              </a:spcBef>
+              <a:spcAft>
+                <a:spcPct val="0"/>
+              </a:spcAft>
+              <a:defRPr sz="3200" b="1">
+                <a:solidFill>
+                  <a:srgbClr val="2A6AB3"/>
+                </a:solidFill>
+                <a:latin typeface="Arial" panose="020B0604020202020204" pitchFamily="34" charset="0"/>
+              </a:defRPr>
+            </a:lvl5pPr>
+            <a:lvl6pPr marL="457200" algn="l" rtl="0" eaLnBrk="1" fontAlgn="base" hangingPunct="1">
+              <a:lnSpc>
+                <a:spcPts val="3800"/>
+              </a:lnSpc>
+              <a:spcBef>
+                <a:spcPct val="0"/>
+              </a:spcBef>
+              <a:spcAft>
+                <a:spcPct val="0"/>
+              </a:spcAft>
+              <a:defRPr sz="3200" b="1">
+                <a:solidFill>
+                  <a:srgbClr val="2A6AB3"/>
+                </a:solidFill>
+                <a:latin typeface="Arial" panose="020B0604020202020204" pitchFamily="34" charset="0"/>
+              </a:defRPr>
+            </a:lvl6pPr>
+            <a:lvl7pPr marL="914400" algn="l" rtl="0" eaLnBrk="1" fontAlgn="base" hangingPunct="1">
+              <a:lnSpc>
+                <a:spcPts val="3800"/>
+              </a:lnSpc>
+              <a:spcBef>
+                <a:spcPct val="0"/>
+              </a:spcBef>
+              <a:spcAft>
+                <a:spcPct val="0"/>
+              </a:spcAft>
+              <a:defRPr sz="3200" b="1">
+                <a:solidFill>
+                  <a:srgbClr val="2A6AB3"/>
+                </a:solidFill>
+                <a:latin typeface="Arial" panose="020B0604020202020204" pitchFamily="34" charset="0"/>
+              </a:defRPr>
+            </a:lvl7pPr>
+            <a:lvl8pPr marL="1371600" algn="l" rtl="0" eaLnBrk="1" fontAlgn="base" hangingPunct="1">
+              <a:lnSpc>
+                <a:spcPts val="3800"/>
+              </a:lnSpc>
+              <a:spcBef>
+                <a:spcPct val="0"/>
+              </a:spcBef>
+              <a:spcAft>
+                <a:spcPct val="0"/>
+              </a:spcAft>
+              <a:defRPr sz="3200" b="1">
+                <a:solidFill>
+                  <a:srgbClr val="2A6AB3"/>
+                </a:solidFill>
+                <a:latin typeface="Arial" panose="020B0604020202020204" pitchFamily="34" charset="0"/>
+              </a:defRPr>
+            </a:lvl8pPr>
+            <a:lvl9pPr marL="1828800" algn="l" rtl="0" eaLnBrk="1" fontAlgn="base" hangingPunct="1">
+              <a:lnSpc>
+                <a:spcPts val="3800"/>
+              </a:lnSpc>
+              <a:spcBef>
+                <a:spcPct val="0"/>
+              </a:spcBef>
+              <a:spcAft>
+                <a:spcPct val="0"/>
+              </a:spcAft>
+              <a:defRPr sz="3200" b="1">
+                <a:solidFill>
+                  <a:srgbClr val="2A6AB3"/>
+                </a:solidFill>
+                <a:latin typeface="Arial" panose="020B0604020202020204" pitchFamily="34" charset="0"/>
+              </a:defRPr>
+            </a:lvl9pPr>
+          </a:lstStyle>
+          <a:p>
+            <a:pPr algn="ctr"/>
+            <a:r>
+              <a:rPr lang="de-CH" sz="1600" dirty="0" smtClean="0">
+                <a:solidFill>
+                  <a:schemeClr val="tx1"/>
+                </a:solidFill>
+                <a:latin typeface="+mn-lt"/>
+              </a:rPr>
+              <a:t>http://tronium.ch.gg</a:t>
+            </a:r>
+            <a:endParaRPr lang="de-CH" sz="1600" dirty="0">
+              <a:solidFill>
+                <a:schemeClr val="tx1"/>
+              </a:solidFill>
+              <a:latin typeface="+mn-lt"/>
+            </a:endParaRPr>
+          </a:p>
+        </p:txBody>
+      </p:sp>
     </p:spTree>
   </p:cSld>
   <p:clrMapOvr>
@@ -4969,25 +5164,6 @@
       </p:grpSpPr>
       <p:sp>
         <p:nvSpPr>
-          <p:cNvPr id="2" name="Titel 1"/>
-          <p:cNvSpPr>
-            <a:spLocks noGrp="1"/>
-          </p:cNvSpPr>
-          <p:nvPr>
-            <p:ph type="title"/>
-          </p:nvPr>
-        </p:nvSpPr>
-        <p:spPr/>
-        <p:txBody>
-          <a:bodyPr/>
-          <a:lstStyle/>
-          <a:p>
-            <a:endParaRPr lang="de-CH"/>
-          </a:p>
-        </p:txBody>
-      </p:sp>
-      <p:sp>
-        <p:nvSpPr>
           <p:cNvPr id="4" name="Foliennummernplatzhalter 3"/>
           <p:cNvSpPr>
             <a:spLocks noGrp="1"/>
@@ -5042,6 +5218,239 @@
           </a:xfrm>
         </p:spPr>
       </p:pic>
+      <p:sp>
+        <p:nvSpPr>
+          <p:cNvPr id="5" name="Titel 1"/>
+          <p:cNvSpPr txBox="1">
+            <a:spLocks/>
+          </p:cNvSpPr>
+          <p:nvPr/>
+        </p:nvSpPr>
+        <p:spPr bwMode="auto">
+          <a:xfrm>
+            <a:off x="541666" y="6226266"/>
+            <a:ext cx="8077200" cy="457200"/>
+          </a:xfrm>
+          <a:prstGeom prst="rect">
+            <a:avLst/>
+          </a:prstGeom>
+          <a:noFill/>
+          <a:ln>
+            <a:noFill/>
+          </a:ln>
+          <a:effectLst/>
+          <a:extLst>
+            <a:ext uri="{909E8E84-426E-40DD-AFC4-6F175D3DCCD1}">
+              <a14:hiddenFill xmlns:a14="http://schemas.microsoft.com/office/drawing/2010/main">
+                <a:solidFill>
+                  <a:schemeClr val="accent1"/>
+                </a:solidFill>
+              </a14:hiddenFill>
+            </a:ext>
+            <a:ext uri="{91240B29-F687-4F45-9708-019B960494DF}">
+              <a14:hiddenLine xmlns:a14="http://schemas.microsoft.com/office/drawing/2010/main" w="9525">
+                <a:solidFill>
+                  <a:schemeClr val="tx1"/>
+                </a:solidFill>
+                <a:miter lim="800000"/>
+                <a:headEnd/>
+                <a:tailEnd/>
+              </a14:hiddenLine>
+            </a:ext>
+            <a:ext uri="{AF507438-7753-43E0-B8FC-AC1667EBCBE1}">
+              <a14:hiddenEffects xmlns:a14="http://schemas.microsoft.com/office/drawing/2010/main">
+                <a:effectLst>
+                  <a:outerShdw dist="35921" dir="2700000" algn="ctr" rotWithShape="0">
+                    <a:schemeClr val="bg2"/>
+                  </a:outerShdw>
+                </a:effectLst>
+              </a14:hiddenEffects>
+            </a:ext>
+          </a:extLst>
+        </p:spPr>
+        <p:txBody>
+          <a:bodyPr vert="horz" wrap="square" lIns="0" tIns="0" rIns="0" bIns="0" numCol="1" anchor="t" anchorCtr="0" compatLnSpc="1">
+            <a:prstTxWarp prst="textNoShape">
+              <a:avLst/>
+            </a:prstTxWarp>
+          </a:bodyPr>
+          <a:lstStyle>
+            <a:lvl1pPr algn="l" rtl="0" eaLnBrk="1" fontAlgn="base" hangingPunct="1">
+              <a:lnSpc>
+                <a:spcPts val="3800"/>
+              </a:lnSpc>
+              <a:spcBef>
+                <a:spcPct val="0"/>
+              </a:spcBef>
+              <a:spcAft>
+                <a:spcPct val="0"/>
+              </a:spcAft>
+              <a:defRPr sz="3200" b="1" kern="1200">
+                <a:solidFill>
+                  <a:srgbClr val="2A6AB3"/>
+                </a:solidFill>
+                <a:latin typeface="+mj-lt"/>
+                <a:ea typeface="+mj-ea"/>
+                <a:cs typeface="+mj-cs"/>
+              </a:defRPr>
+            </a:lvl1pPr>
+            <a:lvl2pPr algn="l" rtl="0" eaLnBrk="1" fontAlgn="base" hangingPunct="1">
+              <a:lnSpc>
+                <a:spcPts val="3800"/>
+              </a:lnSpc>
+              <a:spcBef>
+                <a:spcPct val="0"/>
+              </a:spcBef>
+              <a:spcAft>
+                <a:spcPct val="0"/>
+              </a:spcAft>
+              <a:defRPr sz="3200" b="1">
+                <a:solidFill>
+                  <a:srgbClr val="2A6AB3"/>
+                </a:solidFill>
+                <a:latin typeface="Arial" panose="020B0604020202020204" pitchFamily="34" charset="0"/>
+              </a:defRPr>
+            </a:lvl2pPr>
+            <a:lvl3pPr algn="l" rtl="0" eaLnBrk="1" fontAlgn="base" hangingPunct="1">
+              <a:lnSpc>
+                <a:spcPts val="3800"/>
+              </a:lnSpc>
+              <a:spcBef>
+                <a:spcPct val="0"/>
+              </a:spcBef>
+              <a:spcAft>
+                <a:spcPct val="0"/>
+              </a:spcAft>
+              <a:defRPr sz="3200" b="1">
+                <a:solidFill>
+                  <a:srgbClr val="2A6AB3"/>
+                </a:solidFill>
+                <a:latin typeface="Arial" panose="020B0604020202020204" pitchFamily="34" charset="0"/>
+              </a:defRPr>
+            </a:lvl3pPr>
+            <a:lvl4pPr algn="l" rtl="0" eaLnBrk="1" fontAlgn="base" hangingPunct="1">
+              <a:lnSpc>
+                <a:spcPts val="3800"/>
+              </a:lnSpc>
+              <a:spcBef>
+                <a:spcPct val="0"/>
+              </a:spcBef>
+              <a:spcAft>
+                <a:spcPct val="0"/>
+              </a:spcAft>
+              <a:defRPr sz="3200" b="1">
+                <a:solidFill>
+                  <a:srgbClr val="2A6AB3"/>
+                </a:solidFill>
+                <a:latin typeface="Arial" panose="020B0604020202020204" pitchFamily="34" charset="0"/>
+              </a:defRPr>
+            </a:lvl4pPr>
+            <a:lvl5pPr algn="l" rtl="0" eaLnBrk="1" fontAlgn="base" hangingPunct="1">
+              <a:lnSpc>
+                <a:spcPts val="3800"/>
+              </a:lnSpc>
+              <a:spcBef>
+                <a:spcPct val="0"/>
+              </a:spcBef>
+              <a:spcAft>
+                <a:spcPct val="0"/>
+              </a:spcAft>
+              <a:defRPr sz="3200" b="1">
+                <a:solidFill>
+                  <a:srgbClr val="2A6AB3"/>
+                </a:solidFill>
+                <a:latin typeface="Arial" panose="020B0604020202020204" pitchFamily="34" charset="0"/>
+              </a:defRPr>
+            </a:lvl5pPr>
+            <a:lvl6pPr marL="457200" algn="l" rtl="0" eaLnBrk="1" fontAlgn="base" hangingPunct="1">
+              <a:lnSpc>
+                <a:spcPts val="3800"/>
+              </a:lnSpc>
+              <a:spcBef>
+                <a:spcPct val="0"/>
+              </a:spcBef>
+              <a:spcAft>
+                <a:spcPct val="0"/>
+              </a:spcAft>
+              <a:defRPr sz="3200" b="1">
+                <a:solidFill>
+                  <a:srgbClr val="2A6AB3"/>
+                </a:solidFill>
+                <a:latin typeface="Arial" panose="020B0604020202020204" pitchFamily="34" charset="0"/>
+              </a:defRPr>
+            </a:lvl6pPr>
+            <a:lvl7pPr marL="914400" algn="l" rtl="0" eaLnBrk="1" fontAlgn="base" hangingPunct="1">
+              <a:lnSpc>
+                <a:spcPts val="3800"/>
+              </a:lnSpc>
+              <a:spcBef>
+                <a:spcPct val="0"/>
+              </a:spcBef>
+              <a:spcAft>
+                <a:spcPct val="0"/>
+              </a:spcAft>
+              <a:defRPr sz="3200" b="1">
+                <a:solidFill>
+                  <a:srgbClr val="2A6AB3"/>
+                </a:solidFill>
+                <a:latin typeface="Arial" panose="020B0604020202020204" pitchFamily="34" charset="0"/>
+              </a:defRPr>
+            </a:lvl7pPr>
+            <a:lvl8pPr marL="1371600" algn="l" rtl="0" eaLnBrk="1" fontAlgn="base" hangingPunct="1">
+              <a:lnSpc>
+                <a:spcPts val="3800"/>
+              </a:lnSpc>
+              <a:spcBef>
+                <a:spcPct val="0"/>
+              </a:spcBef>
+              <a:spcAft>
+                <a:spcPct val="0"/>
+              </a:spcAft>
+              <a:defRPr sz="3200" b="1">
+                <a:solidFill>
+                  <a:srgbClr val="2A6AB3"/>
+                </a:solidFill>
+                <a:latin typeface="Arial" panose="020B0604020202020204" pitchFamily="34" charset="0"/>
+              </a:defRPr>
+            </a:lvl8pPr>
+            <a:lvl9pPr marL="1828800" algn="l" rtl="0" eaLnBrk="1" fontAlgn="base" hangingPunct="1">
+              <a:lnSpc>
+                <a:spcPts val="3800"/>
+              </a:lnSpc>
+              <a:spcBef>
+                <a:spcPct val="0"/>
+              </a:spcBef>
+              <a:spcAft>
+                <a:spcPct val="0"/>
+              </a:spcAft>
+              <a:defRPr sz="3200" b="1">
+                <a:solidFill>
+                  <a:srgbClr val="2A6AB3"/>
+                </a:solidFill>
+                <a:latin typeface="Arial" panose="020B0604020202020204" pitchFamily="34" charset="0"/>
+              </a:defRPr>
+            </a:lvl9pPr>
+          </a:lstStyle>
+          <a:p>
+            <a:pPr algn="ctr"/>
+            <a:r>
+              <a:rPr lang="de-CH" sz="1600" dirty="0" smtClean="0">
+                <a:solidFill>
+                  <a:schemeClr val="tx1"/>
+                </a:solidFill>
+                <a:latin typeface="+mn-lt"/>
+              </a:rPr>
+              <a:t>http://tronium.ch.gg</a:t>
+            </a:r>
+            <a:endParaRPr lang="de-CH" sz="1600" dirty="0">
+              <a:solidFill>
+                <a:schemeClr val="tx1"/>
+              </a:solidFill>
+              <a:latin typeface="+mn-lt"/>
+            </a:endParaRPr>
+          </a:p>
+        </p:txBody>
+      </p:sp>
     </p:spTree>
     <p:extLst>
       <p:ext uri="{BB962C8B-B14F-4D97-AF65-F5344CB8AC3E}">
@@ -5089,12 +5498,41 @@
             <p:ph type="title"/>
           </p:nvPr>
         </p:nvSpPr>
-        <p:spPr/>
+        <p:spPr>
+          <a:xfrm>
+            <a:off x="541666" y="6226266"/>
+            <a:ext cx="8077200" cy="457200"/>
+          </a:xfrm>
+        </p:spPr>
         <p:txBody>
           <a:bodyPr/>
           <a:lstStyle/>
           <a:p>
-            <a:endParaRPr lang="de-CH"/>
+            <a:pPr algn="ctr"/>
+            <a:r>
+              <a:rPr lang="de-CH" sz="1600" dirty="0">
+                <a:solidFill>
+                  <a:schemeClr val="tx1"/>
+                </a:solidFill>
+                <a:latin typeface="+mn-lt"/>
+              </a:rPr>
+              <a:t>http://</a:t>
+            </a:r>
+            <a:r>
+              <a:rPr lang="de-CH" sz="1600" dirty="0" smtClean="0">
+                <a:solidFill>
+                  <a:schemeClr val="tx1"/>
+                </a:solidFill>
+                <a:latin typeface="+mn-lt"/>
+              </a:rPr>
+              <a:t>tronium.ch.gg</a:t>
+            </a:r>
+            <a:endParaRPr lang="de-CH" sz="1600" dirty="0">
+              <a:solidFill>
+                <a:schemeClr val="tx1"/>
+              </a:solidFill>
+              <a:latin typeface="+mn-lt"/>
+            </a:endParaRPr>
           </a:p>
         </p:txBody>
       </p:sp>
@@ -5266,6 +5704,239 @@
           </a:xfrm>
         </p:spPr>
       </p:pic>
+      <p:sp>
+        <p:nvSpPr>
+          <p:cNvPr id="5" name="Titel 1"/>
+          <p:cNvSpPr txBox="1">
+            <a:spLocks/>
+          </p:cNvSpPr>
+          <p:nvPr/>
+        </p:nvSpPr>
+        <p:spPr bwMode="auto">
+          <a:xfrm>
+            <a:off x="541666" y="6226266"/>
+            <a:ext cx="8077200" cy="457200"/>
+          </a:xfrm>
+          <a:prstGeom prst="rect">
+            <a:avLst/>
+          </a:prstGeom>
+          <a:noFill/>
+          <a:ln>
+            <a:noFill/>
+          </a:ln>
+          <a:effectLst/>
+          <a:extLst>
+            <a:ext uri="{909E8E84-426E-40DD-AFC4-6F175D3DCCD1}">
+              <a14:hiddenFill xmlns:a14="http://schemas.microsoft.com/office/drawing/2010/main">
+                <a:solidFill>
+                  <a:schemeClr val="accent1"/>
+                </a:solidFill>
+              </a14:hiddenFill>
+            </a:ext>
+            <a:ext uri="{91240B29-F687-4F45-9708-019B960494DF}">
+              <a14:hiddenLine xmlns:a14="http://schemas.microsoft.com/office/drawing/2010/main" w="9525">
+                <a:solidFill>
+                  <a:schemeClr val="tx1"/>
+                </a:solidFill>
+                <a:miter lim="800000"/>
+                <a:headEnd/>
+                <a:tailEnd/>
+              </a14:hiddenLine>
+            </a:ext>
+            <a:ext uri="{AF507438-7753-43E0-B8FC-AC1667EBCBE1}">
+              <a14:hiddenEffects xmlns:a14="http://schemas.microsoft.com/office/drawing/2010/main">
+                <a:effectLst>
+                  <a:outerShdw dist="35921" dir="2700000" algn="ctr" rotWithShape="0">
+                    <a:schemeClr val="bg2"/>
+                  </a:outerShdw>
+                </a:effectLst>
+              </a14:hiddenEffects>
+            </a:ext>
+          </a:extLst>
+        </p:spPr>
+        <p:txBody>
+          <a:bodyPr vert="horz" wrap="square" lIns="0" tIns="0" rIns="0" bIns="0" numCol="1" anchor="t" anchorCtr="0" compatLnSpc="1">
+            <a:prstTxWarp prst="textNoShape">
+              <a:avLst/>
+            </a:prstTxWarp>
+          </a:bodyPr>
+          <a:lstStyle>
+            <a:lvl1pPr algn="l" rtl="0" eaLnBrk="1" fontAlgn="base" hangingPunct="1">
+              <a:lnSpc>
+                <a:spcPts val="3800"/>
+              </a:lnSpc>
+              <a:spcBef>
+                <a:spcPct val="0"/>
+              </a:spcBef>
+              <a:spcAft>
+                <a:spcPct val="0"/>
+              </a:spcAft>
+              <a:defRPr sz="3200" b="1" kern="1200">
+                <a:solidFill>
+                  <a:srgbClr val="2A6AB3"/>
+                </a:solidFill>
+                <a:latin typeface="+mj-lt"/>
+                <a:ea typeface="+mj-ea"/>
+                <a:cs typeface="+mj-cs"/>
+              </a:defRPr>
+            </a:lvl1pPr>
+            <a:lvl2pPr algn="l" rtl="0" eaLnBrk="1" fontAlgn="base" hangingPunct="1">
+              <a:lnSpc>
+                <a:spcPts val="3800"/>
+              </a:lnSpc>
+              <a:spcBef>
+                <a:spcPct val="0"/>
+              </a:spcBef>
+              <a:spcAft>
+                <a:spcPct val="0"/>
+              </a:spcAft>
+              <a:defRPr sz="3200" b="1">
+                <a:solidFill>
+                  <a:srgbClr val="2A6AB3"/>
+                </a:solidFill>
+                <a:latin typeface="Arial" panose="020B0604020202020204" pitchFamily="34" charset="0"/>
+              </a:defRPr>
+            </a:lvl2pPr>
+            <a:lvl3pPr algn="l" rtl="0" eaLnBrk="1" fontAlgn="base" hangingPunct="1">
+              <a:lnSpc>
+                <a:spcPts val="3800"/>
+              </a:lnSpc>
+              <a:spcBef>
+                <a:spcPct val="0"/>
+              </a:spcBef>
+              <a:spcAft>
+                <a:spcPct val="0"/>
+              </a:spcAft>
+              <a:defRPr sz="3200" b="1">
+                <a:solidFill>
+                  <a:srgbClr val="2A6AB3"/>
+                </a:solidFill>
+                <a:latin typeface="Arial" panose="020B0604020202020204" pitchFamily="34" charset="0"/>
+              </a:defRPr>
+            </a:lvl3pPr>
+            <a:lvl4pPr algn="l" rtl="0" eaLnBrk="1" fontAlgn="base" hangingPunct="1">
+              <a:lnSpc>
+                <a:spcPts val="3800"/>
+              </a:lnSpc>
+              <a:spcBef>
+                <a:spcPct val="0"/>
+              </a:spcBef>
+              <a:spcAft>
+                <a:spcPct val="0"/>
+              </a:spcAft>
+              <a:defRPr sz="3200" b="1">
+                <a:solidFill>
+                  <a:srgbClr val="2A6AB3"/>
+                </a:solidFill>
+                <a:latin typeface="Arial" panose="020B0604020202020204" pitchFamily="34" charset="0"/>
+              </a:defRPr>
+            </a:lvl4pPr>
+            <a:lvl5pPr algn="l" rtl="0" eaLnBrk="1" fontAlgn="base" hangingPunct="1">
+              <a:lnSpc>
+                <a:spcPts val="3800"/>
+              </a:lnSpc>
+              <a:spcBef>
+                <a:spcPct val="0"/>
+              </a:spcBef>
+              <a:spcAft>
+                <a:spcPct val="0"/>
+              </a:spcAft>
+              <a:defRPr sz="3200" b="1">
+                <a:solidFill>
+                  <a:srgbClr val="2A6AB3"/>
+                </a:solidFill>
+                <a:latin typeface="Arial" panose="020B0604020202020204" pitchFamily="34" charset="0"/>
+              </a:defRPr>
+            </a:lvl5pPr>
+            <a:lvl6pPr marL="457200" algn="l" rtl="0" eaLnBrk="1" fontAlgn="base" hangingPunct="1">
+              <a:lnSpc>
+                <a:spcPts val="3800"/>
+              </a:lnSpc>
+              <a:spcBef>
+                <a:spcPct val="0"/>
+              </a:spcBef>
+              <a:spcAft>
+                <a:spcPct val="0"/>
+              </a:spcAft>
+              <a:defRPr sz="3200" b="1">
+                <a:solidFill>
+                  <a:srgbClr val="2A6AB3"/>
+                </a:solidFill>
+                <a:latin typeface="Arial" panose="020B0604020202020204" pitchFamily="34" charset="0"/>
+              </a:defRPr>
+            </a:lvl6pPr>
+            <a:lvl7pPr marL="914400" algn="l" rtl="0" eaLnBrk="1" fontAlgn="base" hangingPunct="1">
+              <a:lnSpc>
+                <a:spcPts val="3800"/>
+              </a:lnSpc>
+              <a:spcBef>
+                <a:spcPct val="0"/>
+              </a:spcBef>
+              <a:spcAft>
+                <a:spcPct val="0"/>
+              </a:spcAft>
+              <a:defRPr sz="3200" b="1">
+                <a:solidFill>
+                  <a:srgbClr val="2A6AB3"/>
+                </a:solidFill>
+                <a:latin typeface="Arial" panose="020B0604020202020204" pitchFamily="34" charset="0"/>
+              </a:defRPr>
+            </a:lvl7pPr>
+            <a:lvl8pPr marL="1371600" algn="l" rtl="0" eaLnBrk="1" fontAlgn="base" hangingPunct="1">
+              <a:lnSpc>
+                <a:spcPts val="3800"/>
+              </a:lnSpc>
+              <a:spcBef>
+                <a:spcPct val="0"/>
+              </a:spcBef>
+              <a:spcAft>
+                <a:spcPct val="0"/>
+              </a:spcAft>
+              <a:defRPr sz="3200" b="1">
+                <a:solidFill>
+                  <a:srgbClr val="2A6AB3"/>
+                </a:solidFill>
+                <a:latin typeface="Arial" panose="020B0604020202020204" pitchFamily="34" charset="0"/>
+              </a:defRPr>
+            </a:lvl8pPr>
+            <a:lvl9pPr marL="1828800" algn="l" rtl="0" eaLnBrk="1" fontAlgn="base" hangingPunct="1">
+              <a:lnSpc>
+                <a:spcPts val="3800"/>
+              </a:lnSpc>
+              <a:spcBef>
+                <a:spcPct val="0"/>
+              </a:spcBef>
+              <a:spcAft>
+                <a:spcPct val="0"/>
+              </a:spcAft>
+              <a:defRPr sz="3200" b="1">
+                <a:solidFill>
+                  <a:srgbClr val="2A6AB3"/>
+                </a:solidFill>
+                <a:latin typeface="Arial" panose="020B0604020202020204" pitchFamily="34" charset="0"/>
+              </a:defRPr>
+            </a:lvl9pPr>
+          </a:lstStyle>
+          <a:p>
+            <a:pPr algn="ctr"/>
+            <a:r>
+              <a:rPr lang="de-CH" sz="1600" smtClean="0">
+                <a:solidFill>
+                  <a:schemeClr val="tx1"/>
+                </a:solidFill>
+                <a:latin typeface="+mn-lt"/>
+              </a:rPr>
+              <a:t>http://tronium.ch.gg</a:t>
+            </a:r>
+            <a:endParaRPr lang="de-CH" sz="1600" dirty="0">
+              <a:solidFill>
+                <a:schemeClr val="tx1"/>
+              </a:solidFill>
+              <a:latin typeface="+mn-lt"/>
+            </a:endParaRPr>
+          </a:p>
+        </p:txBody>
+      </p:sp>
     </p:spTree>
     <p:extLst>
       <p:ext uri="{BB962C8B-B14F-4D97-AF65-F5344CB8AC3E}">
@@ -6121,7 +6792,7 @@
   </a:extraClrSchemeLst>
   <a:extLst>
     <a:ext uri="{05A4C25C-085E-4340-85A3-A5531E510DB2}">
-      <thm15:themeFamily xmlns:thm15="http://schemas.microsoft.com/office/thememl/2012/main" xmlns="" name="Office Theme" id="{62F939B6-93AF-4DB8-9C6B-D6C7DFDC589F}" vid="{4A3C46E8-61CC-4603-A589-7422A47A8E4A}"/>
+      <thm15:themeFamily xmlns:thm15="http://schemas.microsoft.com/office/thememl/2012/main" name="Office Theme" id="{62F939B6-93AF-4DB8-9C6B-D6C7DFDC589F}" vid="{4A3C46E8-61CC-4603-A589-7422A47A8E4A}"/>
     </a:ext>
   </a:extLst>
 </a:theme>
@@ -6382,7 +7053,7 @@
   <a:extraClrSchemeLst/>
   <a:extLst>
     <a:ext uri="{05A4C25C-085E-4340-85A3-A5531E510DB2}">
-      <thm15:themeFamily xmlns:thm15="http://schemas.microsoft.com/office/thememl/2012/main" xmlns="" name="Office Theme" id="{62F939B6-93AF-4DB8-9C6B-D6C7DFDC589F}" vid="{4A3C46E8-61CC-4603-A589-7422A47A8E4A}"/>
+      <thm15:themeFamily xmlns:thm15="http://schemas.microsoft.com/office/thememl/2012/main" name="Office Theme" id="{62F939B6-93AF-4DB8-9C6B-D6C7DFDC589F}" vid="{4A3C46E8-61CC-4603-A589-7422A47A8E4A}"/>
     </a:ext>
   </a:extLst>
 </a:theme>
@@ -6643,7 +7314,7 @@
   <a:extraClrSchemeLst/>
   <a:extLst>
     <a:ext uri="{05A4C25C-085E-4340-85A3-A5531E510DB2}">
-      <thm15:themeFamily xmlns:thm15="http://schemas.microsoft.com/office/thememl/2012/main" xmlns="" name="Office Theme" id="{62F939B6-93AF-4DB8-9C6B-D6C7DFDC589F}" vid="{4A3C46E8-61CC-4603-A589-7422A47A8E4A}"/>
+      <thm15:themeFamily xmlns:thm15="http://schemas.microsoft.com/office/thememl/2012/main" name="Office Theme" id="{62F939B6-93AF-4DB8-9C6B-D6C7DFDC589F}" vid="{4A3C46E8-61CC-4603-A589-7422A47A8E4A}"/>
     </a:ext>
   </a:extLst>
 </a:theme>

</xml_diff>